<commit_message>
ändringar inna ignite presentation som påverkat projektet.
</commit_message>
<xml_diff>
--- a/Dokumentation/presentation/Grenmyr_David.pptx
+++ b/Dokumentation/presentation/Grenmyr_David.pptx
@@ -178,7 +178,7 @@
             </a:lvl1pPr>
           </a:lstStyle>
           <a:p>
-            <a:endParaRPr lang="sv-SE"/>
+            <a:endParaRPr lang="sv-SE" dirty="0"/>
           </a:p>
         </p:txBody>
       </p:sp>
@@ -212,9 +212,9 @@
             <a:fld id="{1FE7E61B-1275-42F7-8FC7-A666F900944A}" type="datetimeFigureOut">
               <a:rPr lang="sv-SE" smtClean="0"/>
               <a:pPr/>
-              <a:t>2014-06-01</a:t>
+              <a:t>2014-06-03</a:t>
             </a:fld>
-            <a:endParaRPr lang="sv-SE"/>
+            <a:endParaRPr lang="sv-SE" dirty="0"/>
           </a:p>
         </p:txBody>
       </p:sp>
@@ -247,7 +247,7 @@
           <a:bodyPr vert="horz" lIns="91440" tIns="45720" rIns="91440" bIns="45720" rtlCol="0" anchor="ctr"/>
           <a:lstStyle/>
           <a:p>
-            <a:endParaRPr lang="sv-SE"/>
+            <a:endParaRPr lang="sv-SE" dirty="0"/>
           </a:p>
         </p:txBody>
       </p:sp>
@@ -338,7 +338,7 @@
             </a:lvl1pPr>
           </a:lstStyle>
           <a:p>
-            <a:endParaRPr lang="sv-SE"/>
+            <a:endParaRPr lang="sv-SE" dirty="0"/>
           </a:p>
         </p:txBody>
       </p:sp>
@@ -374,7 +374,7 @@
               <a:pPr/>
               <a:t>‹#›</a:t>
             </a:fld>
-            <a:endParaRPr lang="sv-SE"/>
+            <a:endParaRPr lang="sv-SE" dirty="0"/>
           </a:p>
         </p:txBody>
       </p:sp>
@@ -557,7 +557,7 @@
               <a:pPr/>
               <a:t>1</a:t>
             </a:fld>
-            <a:endParaRPr lang="sv-SE"/>
+            <a:endParaRPr lang="sv-SE" dirty="0"/>
           </a:p>
         </p:txBody>
       </p:sp>
@@ -621,12 +621,8 @@
           <a:lstStyle/>
           <a:p>
             <a:r>
-              <a:rPr lang="sv-SE" b="1" dirty="0" err="1" smtClean="0"/>
-              <a:t>Texur</a:t>
-            </a:r>
-            <a:r>
               <a:rPr lang="sv-SE" b="1" dirty="0" smtClean="0"/>
-              <a:t>. </a:t>
+              <a:t>Texur. </a:t>
             </a:r>
             <a:r>
               <a:rPr lang="sv-SE" dirty="0" smtClean="0"/>
@@ -634,15 +630,7 @@
             </a:r>
             <a:r>
               <a:rPr lang="sv-SE" b="1" dirty="0" smtClean="0"/>
-              <a:t> </a:t>
-            </a:r>
-            <a:r>
-              <a:rPr lang="sv-SE" b="1" dirty="0" err="1" smtClean="0"/>
-              <a:t>Healthbars</a:t>
-            </a:r>
-            <a:r>
-              <a:rPr lang="sv-SE" b="1" dirty="0" smtClean="0"/>
-              <a:t> </a:t>
+              <a:t> Healthbars </a:t>
             </a:r>
             <a:r>
               <a:rPr lang="sv-SE" b="0" dirty="0" smtClean="0"/>
@@ -661,12 +649,8 @@
               <a:t> i högra hörnet. Och </a:t>
             </a:r>
             <a:r>
-              <a:rPr lang="sv-SE" b="1" baseline="0" dirty="0" err="1" smtClean="0"/>
-              <a:t>Crosshair</a:t>
-            </a:r>
-            <a:r>
               <a:rPr lang="sv-SE" b="1" baseline="0" dirty="0" smtClean="0"/>
-              <a:t>.</a:t>
+              <a:t>Crosshair.</a:t>
             </a:r>
             <a:endParaRPr lang="sv-SE" b="1" dirty="0"/>
           </a:p>
@@ -692,7 +676,7 @@
               <a:pPr/>
               <a:t>10</a:t>
             </a:fld>
-            <a:endParaRPr lang="sv-SE"/>
+            <a:endParaRPr lang="sv-SE" dirty="0"/>
           </a:p>
         </p:txBody>
       </p:sp>
@@ -759,7 +743,7 @@
               <a:t> </a:t>
             </a:r>
             <a:r>
-              <a:rPr lang="sv-SE" b="1" baseline="0" dirty="0" err="1" smtClean="0"/>
+              <a:rPr lang="sv-SE" b="1" baseline="0" dirty="0" smtClean="0"/>
               <a:t>spritemap</a:t>
             </a:r>
             <a:r>
@@ -788,15 +772,7 @@
             </a:r>
             <a:r>
               <a:rPr lang="sv-SE" b="0" baseline="0" dirty="0" smtClean="0"/>
-              <a:t>använder också </a:t>
-            </a:r>
-            <a:r>
-              <a:rPr lang="sv-SE" b="0" baseline="0" dirty="0" err="1" smtClean="0"/>
-              <a:t>spritemap</a:t>
-            </a:r>
-            <a:r>
-              <a:rPr lang="sv-SE" b="0" baseline="0" dirty="0" smtClean="0"/>
-              <a:t>. Vill även rita och lägga in </a:t>
+              <a:t>använder också spritemap. Vill även rita och lägga in </a:t>
             </a:r>
             <a:r>
               <a:rPr lang="sv-SE" b="1" baseline="0" dirty="0" smtClean="0"/>
@@ -834,7 +810,7 @@
               <a:pPr/>
               <a:t>11</a:t>
             </a:fld>
-            <a:endParaRPr lang="sv-SE"/>
+            <a:endParaRPr lang="sv-SE" dirty="0"/>
           </a:p>
         </p:txBody>
       </p:sp>
@@ -918,11 +894,7 @@
             </a:r>
             <a:r>
               <a:rPr lang="sv-SE" b="1" baseline="0" dirty="0" smtClean="0"/>
-              <a:t>skapa </a:t>
-            </a:r>
-            <a:r>
-              <a:rPr lang="sv-SE" b="1" baseline="0" dirty="0" err="1" smtClean="0"/>
-              <a:t>campaign</a:t>
+              <a:t>skapa campaign</a:t>
             </a:r>
             <a:r>
               <a:rPr lang="sv-SE" baseline="0" dirty="0" smtClean="0"/>
@@ -952,7 +924,7 @@
               <a:pPr/>
               <a:t>12</a:t>
             </a:fld>
-            <a:endParaRPr lang="sv-SE"/>
+            <a:endParaRPr lang="sv-SE" dirty="0"/>
           </a:p>
         </p:txBody>
       </p:sp>
@@ -1034,7 +1006,7 @@
               <a:pPr/>
               <a:t>13</a:t>
             </a:fld>
-            <a:endParaRPr lang="sv-SE"/>
+            <a:endParaRPr lang="sv-SE" dirty="0"/>
           </a:p>
         </p:txBody>
       </p:sp>
@@ -1117,36 +1089,8 @@
               <a:t>Turbaserat </a:t>
             </a:r>
             <a:r>
-              <a:rPr lang="sv-SE" b="0" baseline="0" dirty="0" err="1" smtClean="0"/>
-              <a:t>fuckade</a:t>
-            </a:r>
-            <a:r>
               <a:rPr lang="sv-SE" b="0" baseline="0" dirty="0" smtClean="0"/>
-              <a:t> upp så mycket kod fick </a:t>
-            </a:r>
-            <a:r>
-              <a:rPr lang="sv-SE" b="0" baseline="0" dirty="0" err="1" smtClean="0"/>
-              <a:t>refaktorera</a:t>
-            </a:r>
-            <a:r>
-              <a:rPr lang="sv-SE" b="0" baseline="0" dirty="0" smtClean="0"/>
-              <a:t>. </a:t>
-            </a:r>
-            <a:r>
-              <a:rPr lang="sv-SE" b="0" baseline="0" dirty="0" err="1" smtClean="0"/>
-              <a:t>Refaktorera</a:t>
-            </a:r>
-            <a:r>
-              <a:rPr lang="sv-SE" b="0" baseline="0" dirty="0" smtClean="0"/>
-              <a:t> </a:t>
-            </a:r>
-            <a:r>
-              <a:rPr lang="sv-SE" b="0" baseline="0" dirty="0" err="1" smtClean="0"/>
-              <a:t>refaktorera</a:t>
-            </a:r>
-            <a:r>
-              <a:rPr lang="sv-SE" b="0" baseline="0" dirty="0" smtClean="0"/>
-              <a:t> hela tiden.</a:t>
+              <a:t>fuckade upp så mycket kod fick refaktorera. Refaktorera refaktorera hela tiden.</a:t>
             </a:r>
             <a:endParaRPr lang="sv-SE" b="0" dirty="0"/>
           </a:p>
@@ -1172,7 +1116,7 @@
               <a:pPr/>
               <a:t>14</a:t>
             </a:fld>
-            <a:endParaRPr lang="sv-SE"/>
+            <a:endParaRPr lang="sv-SE" dirty="0"/>
           </a:p>
         </p:txBody>
       </p:sp>
@@ -1244,15 +1188,7 @@
             </a:r>
             <a:r>
               <a:rPr lang="sv-SE" b="0" baseline="0" dirty="0" smtClean="0"/>
-              <a:t> både tid innan resa och komma ikapp efter, men även eftersom jag missar </a:t>
-            </a:r>
-            <a:r>
-              <a:rPr lang="sv-SE" b="0" baseline="0" dirty="0" err="1" smtClean="0"/>
-              <a:t>obligatorika</a:t>
-            </a:r>
-            <a:r>
-              <a:rPr lang="sv-SE" b="0" baseline="0" dirty="0" smtClean="0"/>
-              <a:t> moment. Men var skönt ändå.</a:t>
+              <a:t> både tid innan resa och komma ikapp efter, men även eftersom jag missar obligatorika moment. Men var skönt ändå.</a:t>
             </a:r>
             <a:endParaRPr lang="sv-SE" b="1" dirty="0"/>
           </a:p>
@@ -1278,7 +1214,7 @@
               <a:pPr/>
               <a:t>15</a:t>
             </a:fld>
-            <a:endParaRPr lang="sv-SE"/>
+            <a:endParaRPr lang="sv-SE" dirty="0"/>
           </a:p>
         </p:txBody>
       </p:sp>
@@ -1353,7 +1289,7 @@
               <a:t>, </a:t>
             </a:r>
             <a:r>
-              <a:rPr lang="sv-SE" b="1" dirty="0" err="1" smtClean="0"/>
+              <a:rPr lang="sv-SE" b="1" dirty="0" smtClean="0"/>
               <a:t>collision</a:t>
             </a:r>
             <a:r>
@@ -1361,7 +1297,7 @@
               <a:t> tidbesparande. Mer </a:t>
             </a:r>
             <a:r>
-              <a:rPr lang="sv-SE" b="1" dirty="0" err="1" smtClean="0"/>
+              <a:rPr lang="sv-SE" b="1" dirty="0" smtClean="0"/>
               <a:t>Unit</a:t>
             </a:r>
             <a:r>
@@ -1378,23 +1314,11 @@
             </a:r>
             <a:r>
               <a:rPr lang="sv-SE" baseline="0" dirty="0" smtClean="0"/>
-              <a:t>men mer </a:t>
-            </a:r>
-            <a:r>
-              <a:rPr lang="sv-SE" baseline="0" dirty="0" err="1" smtClean="0"/>
-              <a:t>unittest</a:t>
-            </a:r>
-            <a:r>
-              <a:rPr lang="sv-SE" baseline="0" dirty="0" smtClean="0"/>
-              <a:t> = </a:t>
+              <a:t>men mer unittest = </a:t>
             </a:r>
             <a:r>
               <a:rPr lang="sv-SE" b="1" baseline="0" dirty="0" smtClean="0"/>
-              <a:t>mindre </a:t>
-            </a:r>
-            <a:r>
-              <a:rPr lang="sv-SE" b="1" baseline="0" dirty="0" err="1" smtClean="0"/>
-              <a:t>refaktorering</a:t>
+              <a:t>mindre refaktorering</a:t>
             </a:r>
             <a:r>
               <a:rPr lang="sv-SE" baseline="0" dirty="0" smtClean="0"/>
@@ -1402,15 +1326,7 @@
             </a:r>
             <a:r>
               <a:rPr lang="sv-SE" b="1" baseline="0" dirty="0" smtClean="0"/>
-              <a:t>Fler </a:t>
-            </a:r>
-            <a:r>
-              <a:rPr lang="sv-SE" b="1" baseline="0" dirty="0" err="1" smtClean="0"/>
-              <a:t>scriptfiler</a:t>
-            </a:r>
-            <a:r>
-              <a:rPr lang="sv-SE" b="1" baseline="0" dirty="0" smtClean="0"/>
-              <a:t>, </a:t>
+              <a:t>Fler scriptfiler, </a:t>
             </a:r>
             <a:r>
               <a:rPr lang="sv-SE" baseline="0" dirty="0" smtClean="0"/>
@@ -1440,7 +1356,7 @@
               <a:pPr/>
               <a:t>16</a:t>
             </a:fld>
-            <a:endParaRPr lang="sv-SE"/>
+            <a:endParaRPr lang="sv-SE" dirty="0"/>
           </a:p>
         </p:txBody>
       </p:sp>
@@ -1598,7 +1514,7 @@
               <a:pPr/>
               <a:t>17</a:t>
             </a:fld>
-            <a:endParaRPr lang="sv-SE"/>
+            <a:endParaRPr lang="sv-SE" dirty="0"/>
           </a:p>
         </p:txBody>
       </p:sp>
@@ -1702,23 +1618,7 @@
             </a:r>
             <a:r>
               <a:rPr lang="sv-SE" b="1" baseline="0" dirty="0" smtClean="0"/>
-              <a:t> för mig helt ny värd. Från workshop 1 –</a:t>
-            </a:r>
-            <a:r>
-              <a:rPr lang="sv-SE" b="1" baseline="0" dirty="0" err="1" smtClean="0"/>
-              <a:t>paper</a:t>
-            </a:r>
-            <a:r>
-              <a:rPr lang="sv-SE" b="1" baseline="0" dirty="0" smtClean="0"/>
-              <a:t> </a:t>
-            </a:r>
-            <a:r>
-              <a:rPr lang="sv-SE" b="1" baseline="0" dirty="0" err="1" smtClean="0"/>
-              <a:t>prototyping</a:t>
-            </a:r>
-            <a:r>
-              <a:rPr lang="sv-SE" b="1" baseline="0" dirty="0" smtClean="0"/>
-              <a:t> och persona </a:t>
+              <a:t> för mig helt ny värd. Från workshop 1 –paper prototyping och persona </a:t>
             </a:r>
             <a:r>
               <a:rPr lang="sv-SE" b="0" baseline="0" dirty="0" smtClean="0"/>
@@ -1788,7 +1688,7 @@
               <a:pPr/>
               <a:t>18</a:t>
             </a:fld>
-            <a:endParaRPr lang="sv-SE"/>
+            <a:endParaRPr lang="sv-SE" dirty="0"/>
           </a:p>
         </p:txBody>
       </p:sp>
@@ -1931,7 +1831,7 @@
               <a:t> som </a:t>
             </a:r>
             <a:r>
-              <a:rPr lang="sv-SE" b="1" baseline="0" dirty="0" err="1" smtClean="0"/>
+              <a:rPr lang="sv-SE" b="1" baseline="0" dirty="0" smtClean="0"/>
               <a:t>photoshop/illustrator</a:t>
             </a:r>
             <a:r>
@@ -2026,7 +1926,7 @@
               <a:pPr/>
               <a:t>19</a:t>
             </a:fld>
-            <a:endParaRPr lang="sv-SE"/>
+            <a:endParaRPr lang="sv-SE" dirty="0"/>
           </a:p>
         </p:txBody>
       </p:sp>
@@ -2110,15 +2010,7 @@
             </a:r>
             <a:r>
               <a:rPr lang="sv-SE" b="0" baseline="0" dirty="0" smtClean="0"/>
-              <a:t>Tack vare min </a:t>
-            </a:r>
-            <a:r>
-              <a:rPr lang="sv-SE" b="0" baseline="0" dirty="0" err="1" smtClean="0"/>
-              <a:t>ubermeny</a:t>
-            </a:r>
-            <a:r>
-              <a:rPr lang="sv-SE" b="0" baseline="0" dirty="0" smtClean="0"/>
-              <a:t> är det lätt att starta. Återkommer mer sen.</a:t>
+              <a:t>Tack vare min ubermeny är det lätt att starta. Återkommer mer sen.</a:t>
             </a:r>
             <a:endParaRPr lang="sv-SE" b="1" dirty="0"/>
           </a:p>
@@ -2144,7 +2036,7 @@
               <a:pPr/>
               <a:t>2</a:t>
             </a:fld>
-            <a:endParaRPr lang="sv-SE"/>
+            <a:endParaRPr lang="sv-SE" dirty="0"/>
           </a:p>
         </p:txBody>
       </p:sp>
@@ -2230,7 +2122,7 @@
               <a:pPr/>
               <a:t>20</a:t>
             </a:fld>
-            <a:endParaRPr lang="sv-SE"/>
+            <a:endParaRPr lang="sv-SE" dirty="0"/>
           </a:p>
         </p:txBody>
       </p:sp>
@@ -2336,7 +2228,7 @@
               <a:pPr/>
               <a:t>3</a:t>
             </a:fld>
-            <a:endParaRPr lang="sv-SE"/>
+            <a:endParaRPr lang="sv-SE" dirty="0"/>
           </a:p>
         </p:txBody>
       </p:sp>
@@ -2412,15 +2304,7 @@
             </a:r>
             <a:r>
               <a:rPr lang="sv-SE" b="1" baseline="0" dirty="0" smtClean="0"/>
-              <a:t>Yngre publik studenter äldre än 12 år </a:t>
-            </a:r>
-            <a:r>
-              <a:rPr lang="sv-SE" b="1" baseline="0" dirty="0" err="1" smtClean="0"/>
-              <a:t>Pegi</a:t>
-            </a:r>
-            <a:r>
-              <a:rPr lang="sv-SE" b="1" baseline="0" dirty="0" smtClean="0"/>
-              <a:t> 12.</a:t>
+              <a:t>Yngre publik studenter äldre än 12 år Pegi 12.</a:t>
             </a:r>
             <a:endParaRPr lang="sv-SE" b="1" dirty="0"/>
           </a:p>
@@ -2446,7 +2330,7 @@
               <a:pPr/>
               <a:t>4</a:t>
             </a:fld>
-            <a:endParaRPr lang="sv-SE"/>
+            <a:endParaRPr lang="sv-SE" dirty="0"/>
           </a:p>
         </p:txBody>
       </p:sp>
@@ -2552,7 +2436,7 @@
               <a:pPr/>
               <a:t>5</a:t>
             </a:fld>
-            <a:endParaRPr lang="sv-SE"/>
+            <a:endParaRPr lang="sv-SE" dirty="0"/>
           </a:p>
         </p:txBody>
       </p:sp>
@@ -2666,7 +2550,7 @@
               <a:pPr/>
               <a:t>6</a:t>
             </a:fld>
-            <a:endParaRPr lang="sv-SE"/>
+            <a:endParaRPr lang="sv-SE" dirty="0"/>
           </a:p>
         </p:txBody>
       </p:sp>
@@ -2788,7 +2672,7 @@
               <a:pPr/>
               <a:t>7</a:t>
             </a:fld>
-            <a:endParaRPr lang="sv-SE"/>
+            <a:endParaRPr lang="sv-SE" dirty="0"/>
           </a:p>
         </p:txBody>
       </p:sp>
@@ -2890,7 +2774,7 @@
               <a:pPr/>
               <a:t>8</a:t>
             </a:fld>
-            <a:endParaRPr lang="sv-SE"/>
+            <a:endParaRPr lang="sv-SE" dirty="0"/>
           </a:p>
         </p:txBody>
       </p:sp>
@@ -2962,27 +2846,11 @@
             </a:r>
             <a:r>
               <a:rPr lang="sv-SE" b="0" baseline="0" dirty="0" smtClean="0"/>
-              <a:t> man vill </a:t>
-            </a:r>
-            <a:r>
-              <a:rPr lang="sv-SE" b="0" baseline="0" dirty="0" err="1" smtClean="0"/>
-              <a:t>toggla</a:t>
-            </a:r>
-            <a:r>
-              <a:rPr lang="sv-SE" b="0" baseline="0" dirty="0" smtClean="0"/>
-              <a:t> upp</a:t>
+              <a:t> man vill toggla upp</a:t>
             </a:r>
             <a:r>
               <a:rPr lang="sv-SE" b="1" baseline="0" dirty="0" smtClean="0"/>
-              <a:t> </a:t>
-            </a:r>
-            <a:r>
-              <a:rPr lang="sv-SE" b="1" baseline="0" dirty="0" err="1" smtClean="0"/>
-              <a:t>keymap</a:t>
-            </a:r>
-            <a:r>
-              <a:rPr lang="sv-SE" b="1" baseline="0" dirty="0" smtClean="0"/>
-              <a:t> som JAG </a:t>
+              <a:t> keymap som JAG </a:t>
             </a:r>
             <a:r>
               <a:rPr lang="sv-SE" b="0" baseline="0" dirty="0" smtClean="0"/>
@@ -3016,7 +2884,7 @@
               <a:pPr/>
               <a:t>9</a:t>
             </a:fld>
-            <a:endParaRPr lang="sv-SE"/>
+            <a:endParaRPr lang="sv-SE" dirty="0"/>
           </a:p>
         </p:txBody>
       </p:sp>
@@ -3210,9 +3078,9 @@
             <a:fld id="{05BF644F-D477-4256-AC6F-40AAC6BF536B}" type="datetime1">
               <a:rPr lang="sv-SE" smtClean="0"/>
               <a:pPr/>
-              <a:t>2014-06-01</a:t>
+              <a:t>2014-06-03</a:t>
             </a:fld>
-            <a:endParaRPr lang="sv-SE"/>
+            <a:endParaRPr lang="sv-SE" dirty="0"/>
           </a:p>
         </p:txBody>
       </p:sp>
@@ -3231,7 +3099,7 @@
           <a:bodyPr/>
           <a:lstStyle/>
           <a:p>
-            <a:endParaRPr lang="sv-SE"/>
+            <a:endParaRPr lang="sv-SE" dirty="0"/>
           </a:p>
         </p:txBody>
       </p:sp>
@@ -3255,7 +3123,7 @@
               <a:pPr/>
               <a:t>‹#›</a:t>
             </a:fld>
-            <a:endParaRPr lang="sv-SE"/>
+            <a:endParaRPr lang="sv-SE" dirty="0"/>
           </a:p>
         </p:txBody>
       </p:sp>
@@ -3382,9 +3250,9 @@
             <a:fld id="{9A50298A-A217-43D7-9717-FD4D6BDAEA9B}" type="datetime1">
               <a:rPr lang="sv-SE" smtClean="0"/>
               <a:pPr/>
-              <a:t>2014-06-01</a:t>
+              <a:t>2014-06-03</a:t>
             </a:fld>
-            <a:endParaRPr lang="sv-SE"/>
+            <a:endParaRPr lang="sv-SE" dirty="0"/>
           </a:p>
         </p:txBody>
       </p:sp>
@@ -3403,7 +3271,7 @@
           <a:bodyPr/>
           <a:lstStyle/>
           <a:p>
-            <a:endParaRPr lang="sv-SE"/>
+            <a:endParaRPr lang="sv-SE" dirty="0"/>
           </a:p>
         </p:txBody>
       </p:sp>
@@ -3427,7 +3295,7 @@
               <a:pPr/>
               <a:t>‹#›</a:t>
             </a:fld>
-            <a:endParaRPr lang="sv-SE"/>
+            <a:endParaRPr lang="sv-SE" dirty="0"/>
           </a:p>
         </p:txBody>
       </p:sp>
@@ -3564,9 +3432,9 @@
             <a:fld id="{06CD44E2-4972-418D-B096-D5D32BE3079C}" type="datetime1">
               <a:rPr lang="sv-SE" smtClean="0"/>
               <a:pPr/>
-              <a:t>2014-06-01</a:t>
+              <a:t>2014-06-03</a:t>
             </a:fld>
-            <a:endParaRPr lang="sv-SE"/>
+            <a:endParaRPr lang="sv-SE" dirty="0"/>
           </a:p>
         </p:txBody>
       </p:sp>
@@ -3585,7 +3453,7 @@
           <a:bodyPr/>
           <a:lstStyle/>
           <a:p>
-            <a:endParaRPr lang="sv-SE"/>
+            <a:endParaRPr lang="sv-SE" dirty="0"/>
           </a:p>
         </p:txBody>
       </p:sp>
@@ -3609,7 +3477,7 @@
               <a:pPr/>
               <a:t>‹#›</a:t>
             </a:fld>
-            <a:endParaRPr lang="sv-SE"/>
+            <a:endParaRPr lang="sv-SE" dirty="0"/>
           </a:p>
         </p:txBody>
       </p:sp>
@@ -3736,9 +3604,9 @@
             <a:fld id="{157C2B06-CEDB-4BBE-ACBD-EF97CB8E51A5}" type="datetime1">
               <a:rPr lang="sv-SE" smtClean="0"/>
               <a:pPr/>
-              <a:t>2014-06-01</a:t>
+              <a:t>2014-06-03</a:t>
             </a:fld>
-            <a:endParaRPr lang="sv-SE"/>
+            <a:endParaRPr lang="sv-SE" dirty="0"/>
           </a:p>
         </p:txBody>
       </p:sp>
@@ -3757,7 +3625,7 @@
           <a:bodyPr/>
           <a:lstStyle/>
           <a:p>
-            <a:endParaRPr lang="sv-SE"/>
+            <a:endParaRPr lang="sv-SE" dirty="0"/>
           </a:p>
         </p:txBody>
       </p:sp>
@@ -3781,7 +3649,7 @@
               <a:pPr/>
               <a:t>‹#›</a:t>
             </a:fld>
-            <a:endParaRPr lang="sv-SE"/>
+            <a:endParaRPr lang="sv-SE" dirty="0"/>
           </a:p>
         </p:txBody>
       </p:sp>
@@ -3984,9 +3852,9 @@
             <a:fld id="{CE1E64E1-D9DD-4B49-A1E3-64F252923AD8}" type="datetime1">
               <a:rPr lang="sv-SE" smtClean="0"/>
               <a:pPr/>
-              <a:t>2014-06-01</a:t>
+              <a:t>2014-06-03</a:t>
             </a:fld>
-            <a:endParaRPr lang="sv-SE"/>
+            <a:endParaRPr lang="sv-SE" dirty="0"/>
           </a:p>
         </p:txBody>
       </p:sp>
@@ -4005,7 +3873,7 @@
           <a:bodyPr/>
           <a:lstStyle/>
           <a:p>
-            <a:endParaRPr lang="sv-SE"/>
+            <a:endParaRPr lang="sv-SE" dirty="0"/>
           </a:p>
         </p:txBody>
       </p:sp>
@@ -4029,7 +3897,7 @@
               <a:pPr/>
               <a:t>‹#›</a:t>
             </a:fld>
-            <a:endParaRPr lang="sv-SE"/>
+            <a:endParaRPr lang="sv-SE" dirty="0"/>
           </a:p>
         </p:txBody>
       </p:sp>
@@ -4274,9 +4142,9 @@
             <a:fld id="{CA2BE0BB-CE9C-45A7-B287-B6B25CFD6BF0}" type="datetime1">
               <a:rPr lang="sv-SE" smtClean="0"/>
               <a:pPr/>
-              <a:t>2014-06-01</a:t>
+              <a:t>2014-06-03</a:t>
             </a:fld>
-            <a:endParaRPr lang="sv-SE"/>
+            <a:endParaRPr lang="sv-SE" dirty="0"/>
           </a:p>
         </p:txBody>
       </p:sp>
@@ -4295,7 +4163,7 @@
           <a:bodyPr/>
           <a:lstStyle/>
           <a:p>
-            <a:endParaRPr lang="sv-SE"/>
+            <a:endParaRPr lang="sv-SE" dirty="0"/>
           </a:p>
         </p:txBody>
       </p:sp>
@@ -4319,7 +4187,7 @@
               <a:pPr/>
               <a:t>‹#›</a:t>
             </a:fld>
-            <a:endParaRPr lang="sv-SE"/>
+            <a:endParaRPr lang="sv-SE" dirty="0"/>
           </a:p>
         </p:txBody>
       </p:sp>
@@ -4698,9 +4566,9 @@
             <a:fld id="{5ADE4154-3513-4F3F-B38A-DC9EBD678482}" type="datetime1">
               <a:rPr lang="sv-SE" smtClean="0"/>
               <a:pPr/>
-              <a:t>2014-06-01</a:t>
+              <a:t>2014-06-03</a:t>
             </a:fld>
-            <a:endParaRPr lang="sv-SE"/>
+            <a:endParaRPr lang="sv-SE" dirty="0"/>
           </a:p>
         </p:txBody>
       </p:sp>
@@ -4719,7 +4587,7 @@
           <a:bodyPr/>
           <a:lstStyle/>
           <a:p>
-            <a:endParaRPr lang="sv-SE"/>
+            <a:endParaRPr lang="sv-SE" dirty="0"/>
           </a:p>
         </p:txBody>
       </p:sp>
@@ -4743,7 +4611,7 @@
               <a:pPr/>
               <a:t>‹#›</a:t>
             </a:fld>
-            <a:endParaRPr lang="sv-SE"/>
+            <a:endParaRPr lang="sv-SE" dirty="0"/>
           </a:p>
         </p:txBody>
       </p:sp>
@@ -4818,9 +4686,9 @@
             <a:fld id="{27AA34A4-415B-4CB7-B4E8-F324A8FA84B9}" type="datetime1">
               <a:rPr lang="sv-SE" smtClean="0"/>
               <a:pPr/>
-              <a:t>2014-06-01</a:t>
+              <a:t>2014-06-03</a:t>
             </a:fld>
-            <a:endParaRPr lang="sv-SE"/>
+            <a:endParaRPr lang="sv-SE" dirty="0"/>
           </a:p>
         </p:txBody>
       </p:sp>
@@ -4839,7 +4707,7 @@
           <a:bodyPr/>
           <a:lstStyle/>
           <a:p>
-            <a:endParaRPr lang="sv-SE"/>
+            <a:endParaRPr lang="sv-SE" dirty="0"/>
           </a:p>
         </p:txBody>
       </p:sp>
@@ -4863,7 +4731,7 @@
               <a:pPr/>
               <a:t>‹#›</a:t>
             </a:fld>
-            <a:endParaRPr lang="sv-SE"/>
+            <a:endParaRPr lang="sv-SE" dirty="0"/>
           </a:p>
         </p:txBody>
       </p:sp>
@@ -4915,9 +4783,9 @@
             <a:fld id="{01D121BD-E188-4722-A4F1-4C5579735366}" type="datetime1">
               <a:rPr lang="sv-SE" smtClean="0"/>
               <a:pPr/>
-              <a:t>2014-06-01</a:t>
+              <a:t>2014-06-03</a:t>
             </a:fld>
-            <a:endParaRPr lang="sv-SE"/>
+            <a:endParaRPr lang="sv-SE" dirty="0"/>
           </a:p>
         </p:txBody>
       </p:sp>
@@ -4936,7 +4804,7 @@
           <a:bodyPr/>
           <a:lstStyle/>
           <a:p>
-            <a:endParaRPr lang="sv-SE"/>
+            <a:endParaRPr lang="sv-SE" dirty="0"/>
           </a:p>
         </p:txBody>
       </p:sp>
@@ -4960,7 +4828,7 @@
               <a:pPr/>
               <a:t>‹#›</a:t>
             </a:fld>
-            <a:endParaRPr lang="sv-SE"/>
+            <a:endParaRPr lang="sv-SE" dirty="0"/>
           </a:p>
         </p:txBody>
       </p:sp>
@@ -5194,9 +5062,9 @@
             <a:fld id="{38299D72-EFD8-485C-A5F7-0ABE31B9BDAB}" type="datetime1">
               <a:rPr lang="sv-SE" smtClean="0"/>
               <a:pPr/>
-              <a:t>2014-06-01</a:t>
+              <a:t>2014-06-03</a:t>
             </a:fld>
-            <a:endParaRPr lang="sv-SE"/>
+            <a:endParaRPr lang="sv-SE" dirty="0"/>
           </a:p>
         </p:txBody>
       </p:sp>
@@ -5215,7 +5083,7 @@
           <a:bodyPr/>
           <a:lstStyle/>
           <a:p>
-            <a:endParaRPr lang="sv-SE"/>
+            <a:endParaRPr lang="sv-SE" dirty="0"/>
           </a:p>
         </p:txBody>
       </p:sp>
@@ -5239,7 +5107,7 @@
               <a:pPr/>
               <a:t>‹#›</a:t>
             </a:fld>
-            <a:endParaRPr lang="sv-SE"/>
+            <a:endParaRPr lang="sv-SE" dirty="0"/>
           </a:p>
         </p:txBody>
       </p:sp>
@@ -5362,7 +5230,7 @@
             </a:lvl9pPr>
           </a:lstStyle>
           <a:p>
-            <a:endParaRPr lang="sv-SE"/>
+            <a:endParaRPr lang="sv-SE" dirty="0"/>
           </a:p>
         </p:txBody>
       </p:sp>
@@ -5449,9 +5317,9 @@
             <a:fld id="{8C4F55BA-0B76-423C-A837-4D3A84B600B1}" type="datetime1">
               <a:rPr lang="sv-SE" smtClean="0"/>
               <a:pPr/>
-              <a:t>2014-06-01</a:t>
+              <a:t>2014-06-03</a:t>
             </a:fld>
-            <a:endParaRPr lang="sv-SE"/>
+            <a:endParaRPr lang="sv-SE" dirty="0"/>
           </a:p>
         </p:txBody>
       </p:sp>
@@ -5470,7 +5338,7 @@
           <a:bodyPr/>
           <a:lstStyle/>
           <a:p>
-            <a:endParaRPr lang="sv-SE"/>
+            <a:endParaRPr lang="sv-SE" dirty="0"/>
           </a:p>
         </p:txBody>
       </p:sp>
@@ -5494,7 +5362,7 @@
               <a:pPr/>
               <a:t>‹#›</a:t>
             </a:fld>
-            <a:endParaRPr lang="sv-SE"/>
+            <a:endParaRPr lang="sv-SE" dirty="0"/>
           </a:p>
         </p:txBody>
       </p:sp>
@@ -5515,9 +5383,27 @@
 <p:sldMaster xmlns:a="http://schemas.openxmlformats.org/drawingml/2006/main" xmlns:r="http://schemas.openxmlformats.org/officeDocument/2006/relationships" xmlns:p="http://schemas.openxmlformats.org/presentationml/2006/main">
   <p:cSld>
     <p:bg>
-      <p:bgRef idx="1001">
-        <a:schemeClr val="bg1"/>
-      </p:bgRef>
+      <p:bgPr>
+        <a:gradFill flip="none" rotWithShape="1">
+          <a:gsLst>
+            <a:gs pos="0">
+              <a:srgbClr val="5E9EFF"/>
+            </a:gs>
+            <a:gs pos="39999">
+              <a:srgbClr val="85C2FF"/>
+            </a:gs>
+            <a:gs pos="70000">
+              <a:srgbClr val="C4D6EB"/>
+            </a:gs>
+            <a:gs pos="100000">
+              <a:srgbClr val="FFEBFA"/>
+            </a:gs>
+          </a:gsLst>
+          <a:lin ang="5400000" scaled="0"/>
+          <a:tileRect/>
+        </a:gradFill>
+        <a:effectLst/>
+      </p:bgPr>
     </p:bg>
     <p:spTree>
       <p:nvGrpSpPr>
@@ -5664,9 +5550,9 @@
             <a:fld id="{2B6EDFE1-2B25-453E-A2B2-AC9085329316}" type="datetime1">
               <a:rPr lang="sv-SE" smtClean="0"/>
               <a:pPr/>
-              <a:t>2014-06-01</a:t>
+              <a:t>2014-06-03</a:t>
             </a:fld>
-            <a:endParaRPr lang="sv-SE"/>
+            <a:endParaRPr lang="sv-SE" dirty="0"/>
           </a:p>
         </p:txBody>
       </p:sp>
@@ -5703,7 +5589,7 @@
             </a:lvl1pPr>
           </a:lstStyle>
           <a:p>
-            <a:endParaRPr lang="sv-SE"/>
+            <a:endParaRPr lang="sv-SE" dirty="0"/>
           </a:p>
         </p:txBody>
       </p:sp>
@@ -5745,7 +5631,7 @@
               <a:pPr/>
               <a:t>‹#›</a:t>
             </a:fld>
-            <a:endParaRPr lang="sv-SE"/>
+            <a:endParaRPr lang="sv-SE" dirty="0"/>
           </a:p>
         </p:txBody>
       </p:sp>
@@ -6057,16 +5943,8 @@
           <a:lstStyle/>
           <a:p>
             <a:r>
-              <a:rPr lang="sv-SE" dirty="0" err="1" smtClean="0"/>
-              <a:t>Rabbid</a:t>
-            </a:r>
-            <a:r>
               <a:rPr lang="sv-SE" dirty="0" smtClean="0"/>
-              <a:t> </a:t>
-            </a:r>
-            <a:r>
-              <a:rPr lang="sv-SE" dirty="0" err="1" smtClean="0"/>
-              <a:t>Wars</a:t>
+              <a:t>Rabbid Wars</a:t>
             </a:r>
             <a:endParaRPr lang="sv-SE" dirty="0"/>
           </a:p>
@@ -6123,7 +6001,7 @@
               <a:pPr/>
               <a:t>1</a:t>
             </a:fld>
-            <a:endParaRPr lang="sv-SE"/>
+            <a:endParaRPr lang="sv-SE" dirty="0"/>
           </a:p>
         </p:txBody>
       </p:sp>
@@ -6215,7 +6093,7 @@
               <a:pPr/>
               <a:t>10</a:t>
             </a:fld>
-            <a:endParaRPr lang="sv-SE"/>
+            <a:endParaRPr lang="sv-SE" dirty="0"/>
           </a:p>
         </p:txBody>
       </p:sp>
@@ -6353,7 +6231,7 @@
               <a:pPr/>
               <a:t>11</a:t>
             </a:fld>
-            <a:endParaRPr lang="sv-SE"/>
+            <a:endParaRPr lang="sv-SE" dirty="0"/>
           </a:p>
         </p:txBody>
       </p:sp>
@@ -6445,7 +6323,7 @@
               <a:pPr/>
               <a:t>12</a:t>
             </a:fld>
-            <a:endParaRPr lang="sv-SE"/>
+            <a:endParaRPr lang="sv-SE" dirty="0"/>
           </a:p>
         </p:txBody>
       </p:sp>
@@ -6642,7 +6520,7 @@
           <a:p>
             <a:r>
               <a:rPr lang="sv-SE" dirty="0" smtClean="0"/>
-              <a:t>Tekniker</a:t>
+              <a:t>Tekniker/Miljö</a:t>
             </a:r>
             <a:endParaRPr lang="sv-SE" dirty="0"/>
           </a:p>
@@ -6664,14 +6542,24 @@
           <a:lstStyle/>
           <a:p>
             <a:r>
-              <a:rPr lang="sv-SE" dirty="0" err="1" smtClean="0"/>
-              <a:t>Javascript</a:t>
+              <a:rPr lang="sv-SE" dirty="0" smtClean="0"/>
+              <a:t>JavaScript</a:t>
+            </a:r>
+          </a:p>
+          <a:p>
+            <a:r>
+              <a:rPr lang="sv-SE" dirty="0" smtClean="0"/>
+              <a:t>HTML5 </a:t>
+            </a:r>
+            <a:r>
+              <a:rPr lang="sv-SE" dirty="0" smtClean="0"/>
+              <a:t>Canvas</a:t>
             </a:r>
             <a:endParaRPr lang="sv-SE" dirty="0" smtClean="0"/>
           </a:p>
           <a:p>
             <a:r>
-              <a:rPr lang="sv-SE" dirty="0" err="1" smtClean="0"/>
+              <a:rPr lang="sv-SE" dirty="0" smtClean="0"/>
               <a:t>Webstorm</a:t>
             </a:r>
             <a:endParaRPr lang="sv-SE" dirty="0" smtClean="0"/>
@@ -6685,31 +6573,23 @@
           <a:p>
             <a:r>
               <a:rPr lang="sv-SE" dirty="0" smtClean="0"/>
-              <a:t>Mycket arbete med HTML5 Canvas element.</a:t>
-            </a:r>
-          </a:p>
-          <a:p>
-            <a:r>
-              <a:rPr lang="sv-SE" dirty="0" err="1" smtClean="0"/>
-              <a:t>Github</a:t>
+              <a:t>Enhetstestning</a:t>
             </a:r>
             <a:r>
               <a:rPr lang="sv-SE" dirty="0" smtClean="0"/>
-              <a:t> versionshantering.</a:t>
-            </a:r>
-          </a:p>
-          <a:p>
+              <a:t>: </a:t>
+            </a:r>
             <a:r>
               <a:rPr lang="sv-SE" dirty="0" smtClean="0"/>
-              <a:t>Enhetstestning:</a:t>
+              <a:t>mocha</a:t>
             </a:r>
             <a:r>
               <a:rPr lang="sv-SE" dirty="0" smtClean="0"/>
-              <a:t> </a:t>
-            </a:r>
-            <a:r>
-              <a:rPr lang="sv-SE" dirty="0" err="1" smtClean="0"/>
-              <a:t>mocha</a:t>
+              <a:t>, Chai, </a:t>
+            </a:r>
+            <a:r>
+              <a:rPr lang="sv-SE" dirty="0" smtClean="0"/>
+              <a:t>sinon</a:t>
             </a:r>
             <a:r>
               <a:rPr lang="sv-SE" dirty="0" smtClean="0"/>
@@ -6717,18 +6597,6 @@
             </a:r>
             <a:r>
               <a:rPr lang="sv-SE" dirty="0" smtClean="0"/>
-              <a:t>Chai, </a:t>
-            </a:r>
-            <a:r>
-              <a:rPr lang="sv-SE" dirty="0" err="1" smtClean="0"/>
-              <a:t>sinon</a:t>
-            </a:r>
-            <a:r>
-              <a:rPr lang="sv-SE" dirty="0" smtClean="0"/>
-              <a:t>, </a:t>
-            </a:r>
-            <a:r>
-              <a:rPr lang="sv-SE" dirty="0" err="1" smtClean="0"/>
               <a:t>sinon-chai</a:t>
             </a:r>
             <a:endParaRPr lang="sv-SE" dirty="0"/>
@@ -6755,7 +6623,7 @@
               <a:pPr/>
               <a:t>13</a:t>
             </a:fld>
-            <a:endParaRPr lang="sv-SE"/>
+            <a:endParaRPr lang="sv-SE" dirty="0"/>
           </a:p>
         </p:txBody>
       </p:sp>
@@ -6847,7 +6715,7 @@
               <a:pPr/>
               <a:t>14</a:t>
             </a:fld>
-            <a:endParaRPr lang="sv-SE"/>
+            <a:endParaRPr lang="sv-SE" dirty="0"/>
           </a:p>
         </p:txBody>
       </p:sp>
@@ -6976,7 +6844,7 @@
               <a:pPr/>
               <a:t>15</a:t>
             </a:fld>
-            <a:endParaRPr lang="sv-SE"/>
+            <a:endParaRPr lang="sv-SE" dirty="0"/>
           </a:p>
         </p:txBody>
       </p:sp>
@@ -7096,7 +6964,7 @@
               <a:pPr/>
               <a:t>16</a:t>
             </a:fld>
-            <a:endParaRPr lang="sv-SE"/>
+            <a:endParaRPr lang="sv-SE" dirty="0"/>
           </a:p>
         </p:txBody>
       </p:sp>
@@ -7184,7 +7052,7 @@
           <a:lstStyle/>
           <a:p>
             <a:r>
-              <a:rPr lang="sv-SE" dirty="0" err="1" smtClean="0"/>
+              <a:rPr lang="sv-SE" dirty="0" smtClean="0"/>
               <a:t>Scrum</a:t>
             </a:r>
             <a:endParaRPr lang="sv-SE" dirty="0"/>
@@ -7234,7 +7102,7 @@
               <a:pPr/>
               <a:t>17</a:t>
             </a:fld>
-            <a:endParaRPr lang="sv-SE"/>
+            <a:endParaRPr lang="sv-SE" dirty="0"/>
           </a:p>
         </p:txBody>
       </p:sp>
@@ -7352,7 +7220,7 @@
               <a:pPr/>
               <a:t>18</a:t>
             </a:fld>
-            <a:endParaRPr lang="sv-SE"/>
+            <a:endParaRPr lang="sv-SE" dirty="0"/>
           </a:p>
         </p:txBody>
       </p:sp>
@@ -7382,7 +7250,7 @@
           </a:bodyPr>
           <a:lstStyle/>
           <a:p>
-            <a:endParaRPr lang="sv-SE"/>
+            <a:endParaRPr lang="sv-SE" dirty="0"/>
           </a:p>
         </p:txBody>
       </p:sp>
@@ -7412,7 +7280,7 @@
           </a:bodyPr>
           <a:lstStyle/>
           <a:p>
-            <a:endParaRPr lang="sv-SE"/>
+            <a:endParaRPr lang="sv-SE" dirty="0"/>
           </a:p>
         </p:txBody>
       </p:sp>
@@ -7591,7 +7459,7 @@
               <a:pPr/>
               <a:t>19</a:t>
             </a:fld>
-            <a:endParaRPr lang="sv-SE"/>
+            <a:endParaRPr lang="sv-SE" dirty="0"/>
           </a:p>
         </p:txBody>
       </p:sp>
@@ -7683,23 +7551,7 @@
           <a:p>
             <a:r>
               <a:rPr lang="sv-SE" dirty="0" smtClean="0"/>
-              <a:t>Varför </a:t>
-            </a:r>
-            <a:r>
-              <a:rPr lang="sv-SE" dirty="0" err="1" smtClean="0"/>
-              <a:t>Rabbid</a:t>
-            </a:r>
-            <a:r>
-              <a:rPr lang="sv-SE" dirty="0" smtClean="0"/>
-              <a:t> </a:t>
-            </a:r>
-            <a:r>
-              <a:rPr lang="sv-SE" dirty="0" err="1" smtClean="0"/>
-              <a:t>Wars</a:t>
-            </a:r>
-            <a:r>
-              <a:rPr lang="sv-SE" dirty="0" smtClean="0"/>
-              <a:t> i pausen?</a:t>
+              <a:t>Varför Rabbid Wars i pausen?</a:t>
             </a:r>
             <a:endParaRPr lang="sv-SE" dirty="0"/>
           </a:p>
@@ -7771,7 +7623,7 @@
               <a:pPr/>
               <a:t>2</a:t>
             </a:fld>
-            <a:endParaRPr lang="sv-SE"/>
+            <a:endParaRPr lang="sv-SE" dirty="0"/>
           </a:p>
         </p:txBody>
       </p:sp>
@@ -7893,7 +7745,7 @@
           </a:bodyPr>
           <a:lstStyle/>
           <a:p>
-            <a:endParaRPr lang="sv-SE"/>
+            <a:endParaRPr lang="sv-SE" dirty="0"/>
           </a:p>
         </p:txBody>
       </p:sp>
@@ -8011,7 +7863,7 @@
               <a:pPr/>
               <a:t>3</a:t>
             </a:fld>
-            <a:endParaRPr lang="sv-SE"/>
+            <a:endParaRPr lang="sv-SE" dirty="0"/>
           </a:p>
         </p:txBody>
       </p:sp>
@@ -8132,7 +7984,7 @@
               <a:pPr/>
               <a:t>4</a:t>
             </a:fld>
-            <a:endParaRPr lang="sv-SE"/>
+            <a:endParaRPr lang="sv-SE" dirty="0"/>
           </a:p>
         </p:txBody>
       </p:sp>
@@ -8251,7 +8103,6 @@
               <a:rPr lang="sv-SE" dirty="0" smtClean="0"/>
               <a:t>Här är mina krav utifrån användarvänlighet.</a:t>
             </a:r>
-            <a:endParaRPr lang="sv-SE" dirty="0" smtClean="0"/>
           </a:p>
           <a:p>
             <a:pPr>
@@ -8259,15 +8110,7 @@
             </a:pPr>
             <a:r>
               <a:rPr lang="sv-SE" dirty="0" smtClean="0"/>
-              <a:t>BK1.1 Användare ska bara behöva välja av befintliga banor för att starta </a:t>
-            </a:r>
-            <a:r>
-              <a:rPr lang="sv-SE" dirty="0" smtClean="0"/>
-              <a:t>omgång</a:t>
-            </a:r>
-            <a:r>
-              <a:rPr lang="sv-SE" dirty="0" smtClean="0"/>
-              <a:t>.</a:t>
+              <a:t>BK1.1 Användare ska bara behöva välja av befintliga banor för att starta omgång.</a:t>
             </a:r>
           </a:p>
           <a:p>
@@ -8276,11 +8119,7 @@
             </a:pPr>
             <a:r>
               <a:rPr lang="sv-SE" dirty="0" smtClean="0"/>
-              <a:t>BK1.2 Välj enkelt hur många lagmedlemmar du och datorn ska ha</a:t>
-            </a:r>
-            <a:r>
-              <a:rPr lang="sv-SE" dirty="0" smtClean="0"/>
-              <a:t>.</a:t>
+              <a:t>BK1.2 Välj enkelt hur många lagmedlemmar du och datorn ska ha.</a:t>
             </a:r>
           </a:p>
           <a:p>
@@ -8317,7 +8156,7 @@
               <a:pPr/>
               <a:t>5</a:t>
             </a:fld>
-            <a:endParaRPr lang="sv-SE"/>
+            <a:endParaRPr lang="sv-SE" dirty="0"/>
           </a:p>
         </p:txBody>
       </p:sp>
@@ -8432,7 +8271,7 @@
               <a:pPr/>
               <a:t>6</a:t>
             </a:fld>
-            <a:endParaRPr lang="sv-SE"/>
+            <a:endParaRPr lang="sv-SE" dirty="0"/>
           </a:p>
         </p:txBody>
       </p:sp>
@@ -8547,7 +8386,7 @@
               <a:pPr/>
               <a:t>7</a:t>
             </a:fld>
-            <a:endParaRPr lang="sv-SE"/>
+            <a:endParaRPr lang="sv-SE" dirty="0"/>
           </a:p>
         </p:txBody>
       </p:sp>
@@ -8666,7 +8505,7 @@
               <a:pPr/>
               <a:t>8</a:t>
             </a:fld>
-            <a:endParaRPr lang="sv-SE"/>
+            <a:endParaRPr lang="sv-SE" dirty="0"/>
           </a:p>
         </p:txBody>
       </p:sp>
@@ -8784,7 +8623,7 @@
               <a:pPr/>
               <a:t>9</a:t>
             </a:fld>
-            <a:endParaRPr lang="sv-SE"/>
+            <a:endParaRPr lang="sv-SE" dirty="0"/>
           </a:p>
         </p:txBody>
       </p:sp>

</xml_diff>